<commit_message>
screenshots rm, rewievs added, new graph present
</commit_message>
<xml_diff>
--- a/Task 1 Presentation.pptx
+++ b/Task 1 Presentation.pptx
@@ -268,7 +268,7 @@
           <a:p>
             <a:fld id="{26BC3862-9A0E-8D45-8851-D3D1E9E79E35}" type="datetimeFigureOut">
               <a:rPr lang="en-GB" smtClean="0"/>
-              <a:t>28/11/2022</a:t>
+              <a:t>30/11/2022</a:t>
             </a:fld>
             <a:endParaRPr lang="en-GB"/>
           </a:p>
@@ -445,7 +445,7 @@
           <a:p>
             <a:fld id="{6F219FAC-6822-5D45-B6D7-159040EBDA1D}" type="datetimeFigureOut">
               <a:rPr lang="en-US" smtClean="0"/>
-              <a:t>11/28/2022</a:t>
+              <a:t>11/30/2022</a:t>
             </a:fld>
             <a:endParaRPr lang="en-US"/>
           </a:p>
@@ -1130,7 +1130,7 @@
             <a:fld id="{0CBD1D9E-D27F-4554-BE6E-550908FE1FBE}" type="datetime1">
               <a:rPr lang="en-GB" smtClean="0"/>
               <a:pPr/>
-              <a:t>28/11/2022</a:t>
+              <a:t>30/11/2022</a:t>
             </a:fld>
             <a:endParaRPr lang="en-GB"/>
           </a:p>
@@ -2127,7 +2127,7 @@
             <a:fld id="{0CBD1D9E-D27F-4554-BE6E-550908FE1FBE}" type="datetime1">
               <a:rPr lang="en-GB" smtClean="0"/>
               <a:pPr/>
-              <a:t>28/11/2022</a:t>
+              <a:t>30/11/2022</a:t>
             </a:fld>
             <a:endParaRPr lang="en-GB"/>
           </a:p>
@@ -2618,19 +2618,17 @@
       </p:sp>
       <p:pic>
         <p:nvPicPr>
-          <p:cNvPr id="4" name="Рисунок 4">
+          <p:cNvPr id="6" name="Рисунок 6">
             <a:extLst>
               <a:ext uri="{FF2B5EF4-FFF2-40B4-BE49-F238E27FC236}">
-                <a16:creationId xmlns:a16="http://schemas.microsoft.com/office/drawing/2014/main" id="{3EF897A4-F900-42B0-8E6A-A36794B6B149}"/>
+                <a16:creationId xmlns:a16="http://schemas.microsoft.com/office/drawing/2014/main" id="{A45FD696-C6BA-4410-8C2C-1B24854E5900}"/>
               </a:ext>
             </a:extLst>
           </p:cNvPr>
           <p:cNvPicPr>
-            <a:picLocks noGrp="1" noChangeAspect="1"/>
+            <a:picLocks noChangeAspect="1"/>
           </p:cNvPicPr>
-          <p:nvPr>
-            <p:ph idx="11"/>
-          </p:nvPr>
+          <p:nvPr/>
         </p:nvPicPr>
         <p:blipFill>
           <a:blip r:embed="rId2"/>
@@ -2640,17 +2638,20 @@
         </p:blipFill>
         <p:spPr>
           <a:xfrm>
-            <a:off x="127949" y="1121802"/>
-            <a:ext cx="3483022" cy="2952948"/>
+            <a:off x="133864" y="1168589"/>
+            <a:ext cx="5598791" cy="4660141"/>
           </a:xfrm>
+          <a:prstGeom prst="rect">
+            <a:avLst/>
+          </a:prstGeom>
         </p:spPr>
       </p:pic>
       <p:pic>
         <p:nvPicPr>
-          <p:cNvPr id="9" name="Рисунок 9">
+          <p:cNvPr id="7" name="Рисунок 7">
             <a:extLst>
               <a:ext uri="{FF2B5EF4-FFF2-40B4-BE49-F238E27FC236}">
-                <a16:creationId xmlns:a16="http://schemas.microsoft.com/office/drawing/2014/main" id="{535EF512-8EC6-4ED2-A31B-7E6FC238C62B}"/>
+                <a16:creationId xmlns:a16="http://schemas.microsoft.com/office/drawing/2014/main" id="{44DF3A47-C58D-48AB-B223-9A7D20ABD961}"/>
               </a:ext>
             </a:extLst>
           </p:cNvPr>
@@ -2667,8 +2668,8 @@
         </p:blipFill>
         <p:spPr>
           <a:xfrm>
-            <a:off x="3726914" y="1167172"/>
-            <a:ext cx="4274717" cy="2907578"/>
+            <a:off x="5558619" y="1168590"/>
+            <a:ext cx="2337441" cy="5365922"/>
           </a:xfrm>
           <a:prstGeom prst="rect">
             <a:avLst/>
@@ -2677,10 +2678,10 @@
       </p:pic>
       <p:pic>
         <p:nvPicPr>
-          <p:cNvPr id="10" name="Рисунок 10">
+          <p:cNvPr id="8" name="Рисунок 12">
             <a:extLst>
               <a:ext uri="{FF2B5EF4-FFF2-40B4-BE49-F238E27FC236}">
-                <a16:creationId xmlns:a16="http://schemas.microsoft.com/office/drawing/2014/main" id="{89EDCD5A-B1D7-4339-89D2-68F55EA649D6}"/>
+                <a16:creationId xmlns:a16="http://schemas.microsoft.com/office/drawing/2014/main" id="{DBE367B2-A577-4101-9EED-B8C43FA4E5E8}"/>
               </a:ext>
             </a:extLst>
           </p:cNvPr>
@@ -2697,8 +2698,8 @@
         </p:blipFill>
         <p:spPr>
           <a:xfrm>
-            <a:off x="8117575" y="1121802"/>
-            <a:ext cx="4074425" cy="2965647"/>
+            <a:off x="7896061" y="1168590"/>
+            <a:ext cx="4162076" cy="2743873"/>
           </a:xfrm>
           <a:prstGeom prst="rect">
             <a:avLst/>
@@ -2707,10 +2708,10 @@
       </p:pic>
       <p:pic>
         <p:nvPicPr>
-          <p:cNvPr id="11" name="Рисунок 11">
+          <p:cNvPr id="13" name="Рисунок 13">
             <a:extLst>
               <a:ext uri="{FF2B5EF4-FFF2-40B4-BE49-F238E27FC236}">
-                <a16:creationId xmlns:a16="http://schemas.microsoft.com/office/drawing/2014/main" id="{1E3533F0-8A61-498D-853C-F123C853C4D4}"/>
+                <a16:creationId xmlns:a16="http://schemas.microsoft.com/office/drawing/2014/main" id="{558A079B-B664-4466-8FE0-671E393D35D8}"/>
               </a:ext>
             </a:extLst>
           </p:cNvPr>
@@ -2727,247 +2728,14 @@
         </p:blipFill>
         <p:spPr>
           <a:xfrm>
-            <a:off x="127949" y="4074750"/>
-            <a:ext cx="1933845" cy="2783250"/>
+            <a:off x="7896061" y="3752016"/>
+            <a:ext cx="4295939" cy="3105984"/>
           </a:xfrm>
           <a:prstGeom prst="rect">
             <a:avLst/>
           </a:prstGeom>
         </p:spPr>
       </p:pic>
-      <p:pic>
-        <p:nvPicPr>
-          <p:cNvPr id="12" name="Рисунок 12">
-            <a:extLst>
-              <a:ext uri="{FF2B5EF4-FFF2-40B4-BE49-F238E27FC236}">
-                <a16:creationId xmlns:a16="http://schemas.microsoft.com/office/drawing/2014/main" id="{65EFA82F-61FC-4DFF-AEC6-36F8003C7729}"/>
-              </a:ext>
-            </a:extLst>
-          </p:cNvPr>
-          <p:cNvPicPr>
-            <a:picLocks noChangeAspect="1"/>
-          </p:cNvPicPr>
-          <p:nvPr/>
-        </p:nvPicPr>
-        <p:blipFill>
-          <a:blip r:embed="rId6"/>
-          <a:stretch>
-            <a:fillRect/>
-          </a:stretch>
-        </p:blipFill>
-        <p:spPr>
-          <a:xfrm>
-            <a:off x="2061794" y="4209680"/>
-            <a:ext cx="2133898" cy="2648320"/>
-          </a:xfrm>
-          <a:prstGeom prst="rect">
-            <a:avLst/>
-          </a:prstGeom>
-        </p:spPr>
-      </p:pic>
-      <p:graphicFrame>
-        <p:nvGraphicFramePr>
-          <p:cNvPr id="16" name="Таблица 16">
-            <a:extLst>
-              <a:ext uri="{FF2B5EF4-FFF2-40B4-BE49-F238E27FC236}">
-                <a16:creationId xmlns:a16="http://schemas.microsoft.com/office/drawing/2014/main" id="{7EDF1444-D426-4525-B447-A0727D4DB4EF}"/>
-              </a:ext>
-            </a:extLst>
-          </p:cNvPr>
-          <p:cNvGraphicFramePr>
-            <a:graphicFrameLocks noGrp="1"/>
-          </p:cNvGraphicFramePr>
-          <p:nvPr>
-            <p:extLst>
-              <p:ext uri="{D42A27DB-BD31-4B8C-83A1-F6EECF244321}">
-                <p14:modId xmlns:p14="http://schemas.microsoft.com/office/powerpoint/2010/main" val="1856111116"/>
-              </p:ext>
-            </p:extLst>
-          </p:nvPr>
-        </p:nvGraphicFramePr>
-        <p:xfrm>
-          <a:off x="4195692" y="4209679"/>
-          <a:ext cx="7868358" cy="2543120"/>
-        </p:xfrm>
-        <a:graphic>
-          <a:graphicData uri="http://schemas.openxmlformats.org/drawingml/2006/table">
-            <a:tbl>
-              <a:tblPr firstRow="1" bandRow="1">
-                <a:tableStyleId>{5C22544A-7EE6-4342-B048-85BDC9FD1C3A}</a:tableStyleId>
-              </a:tblPr>
-              <a:tblGrid>
-                <a:gridCol w="2622786">
-                  <a:extLst>
-                    <a:ext uri="{9D8B030D-6E8A-4147-A177-3AD203B41FA5}">
-                      <a16:colId xmlns:a16="http://schemas.microsoft.com/office/drawing/2014/main" val="4228589274"/>
-                    </a:ext>
-                  </a:extLst>
-                </a:gridCol>
-                <a:gridCol w="2622786">
-                  <a:extLst>
-                    <a:ext uri="{9D8B030D-6E8A-4147-A177-3AD203B41FA5}">
-                      <a16:colId xmlns:a16="http://schemas.microsoft.com/office/drawing/2014/main" val="1875071528"/>
-                    </a:ext>
-                  </a:extLst>
-                </a:gridCol>
-                <a:gridCol w="2622786">
-                  <a:extLst>
-                    <a:ext uri="{9D8B030D-6E8A-4147-A177-3AD203B41FA5}">
-                      <a16:colId xmlns:a16="http://schemas.microsoft.com/office/drawing/2014/main" val="592679234"/>
-                    </a:ext>
-                  </a:extLst>
-                </a:gridCol>
-              </a:tblGrid>
-              <a:tr h="1250459">
-                <a:tc>
-                  <a:txBody>
-                    <a:bodyPr/>
-                    <a:lstStyle/>
-                    <a:p>
-                      <a:r>
-                        <a:rPr lang="az-Latn-AZ" dirty="0"/>
-                        <a:t>Total 71 </a:t>
-                      </a:r>
-                      <a:r>
-                        <a:rPr lang="en-US" dirty="0"/>
-                        <a:t>reviews from 9 </a:t>
-                      </a:r>
-                    </a:p>
-                    <a:p>
-                      <a:r>
-                        <a:rPr lang="en-US" dirty="0"/>
-                        <a:t>countries</a:t>
-                      </a:r>
-                      <a:endParaRPr lang="ru-RU" dirty="0"/>
-                    </a:p>
-                  </a:txBody>
-                  <a:tcPr/>
-                </a:tc>
-                <a:tc>
-                  <a:txBody>
-                    <a:bodyPr/>
-                    <a:lstStyle/>
-                    <a:p>
-                      <a:r>
-                        <a:rPr lang="en-US" dirty="0"/>
-                        <a:t>Canada, Germany have 1 rates but they are more than others. </a:t>
-                      </a:r>
-                    </a:p>
-                  </a:txBody>
-                  <a:tcPr/>
-                </a:tc>
-                <a:tc>
-                  <a:txBody>
-                    <a:bodyPr/>
-                    <a:lstStyle/>
-                    <a:p>
-                      <a:r>
-                        <a:rPr lang="en-US" dirty="0"/>
-                        <a:t>Big amount of rates from 8-10 is under 2018 year </a:t>
-                      </a:r>
-                      <a:endParaRPr lang="ru-RU" dirty="0"/>
-                    </a:p>
-                  </a:txBody>
-                  <a:tcPr/>
-                </a:tc>
-                <a:extLst>
-                  <a:ext uri="{0D108BD9-81ED-4DB2-BD59-A6C34878D82A}">
-                    <a16:rowId xmlns:a16="http://schemas.microsoft.com/office/drawing/2014/main" val="4102927242"/>
-                  </a:ext>
-                </a:extLst>
-              </a:tr>
-              <a:tr h="1292661">
-                <a:tc>
-                  <a:txBody>
-                    <a:bodyPr/>
-                    <a:lstStyle/>
-                    <a:p>
-                      <a:r>
-                        <a:rPr lang="en-US" dirty="0"/>
-                        <a:t>Most of rating from UK</a:t>
-                      </a:r>
-                    </a:p>
-                    <a:p>
-                      <a:r>
-                        <a:rPr lang="en-US" dirty="0"/>
-                        <a:t>And mean point is</a:t>
-                      </a:r>
-                    </a:p>
-                    <a:p>
-                      <a:r>
-                        <a:rPr lang="en-US" dirty="0"/>
-                        <a:t>Approx. ~ 1,4</a:t>
-                      </a:r>
-                      <a:endParaRPr lang="ru-RU" dirty="0"/>
-                    </a:p>
-                    <a:p>
-                      <a:endParaRPr lang="ru-RU" dirty="0"/>
-                    </a:p>
-                  </a:txBody>
-                  <a:tcPr/>
-                </a:tc>
-                <a:tc>
-                  <a:txBody>
-                    <a:bodyPr/>
-                    <a:lstStyle/>
-                    <a:p>
-                      <a:r>
-                        <a:rPr lang="az-Latn-AZ" dirty="0"/>
-                        <a:t>The average point </a:t>
-                      </a:r>
-                      <a:r>
-                        <a:rPr lang="en-US" dirty="0"/>
-                        <a:t>is</a:t>
-                      </a:r>
-                      <a:r>
-                        <a:rPr lang="az-Latn-AZ" dirty="0"/>
-                        <a:t> up with these features and makes up a significant portion of </a:t>
-                      </a:r>
-                      <a:r>
-                        <a:rPr lang="en-US" dirty="0"/>
-                        <a:t>all</a:t>
-                      </a:r>
-                      <a:r>
-                        <a:rPr lang="az-Latn-AZ" dirty="0"/>
-                        <a:t> </a:t>
-                      </a:r>
-                      <a:r>
-                        <a:rPr lang="en-US" dirty="0"/>
-                        <a:t>votes</a:t>
-                      </a:r>
-                      <a:r>
-                        <a:rPr lang="az-Latn-AZ" dirty="0"/>
-                        <a:t>.</a:t>
-                      </a:r>
-                      <a:endParaRPr lang="ru-RU" dirty="0"/>
-                    </a:p>
-                  </a:txBody>
-                  <a:tcPr/>
-                </a:tc>
-                <a:tc>
-                  <a:txBody>
-                    <a:bodyPr/>
-                    <a:lstStyle/>
-                    <a:p>
-                      <a:r>
-                        <a:rPr lang="en-US" dirty="0"/>
-                        <a:t>its seems customers don’t send feedbacks or company didn’t monitor this works</a:t>
-                      </a:r>
-                      <a:endParaRPr lang="ru-RU" dirty="0"/>
-                    </a:p>
-                  </a:txBody>
-                  <a:tcPr/>
-                </a:tc>
-                <a:extLst>
-                  <a:ext uri="{0D108BD9-81ED-4DB2-BD59-A6C34878D82A}">
-                    <a16:rowId xmlns:a16="http://schemas.microsoft.com/office/drawing/2014/main" val="243515694"/>
-                  </a:ext>
-                </a:extLst>
-              </a:tr>
-            </a:tbl>
-          </a:graphicData>
-        </a:graphic>
-      </p:graphicFrame>
     </p:spTree>
     <p:extLst>
       <p:ext uri="{BB962C8B-B14F-4D97-AF65-F5344CB8AC3E}">
@@ -4186,15 +3954,6 @@
 </file>
 
 <file path=customXml/item2.xml><?xml version="1.0" encoding="utf-8"?>
-<?mso-contentType ?>
-<FormTemplates xmlns="http://schemas.microsoft.com/sharepoint/v3/contenttype/forms">
-  <Display>DocumentLibraryForm</Display>
-  <Edit>DocumentLibraryForm</Edit>
-  <New>DocumentLibraryForm</New>
-</FormTemplates>
-</file>
-
-<file path=customXml/item3.xml><?xml version="1.0" encoding="utf-8"?>
 <ct:contentTypeSchema xmlns:ct="http://schemas.microsoft.com/office/2006/metadata/contentType" xmlns:ma="http://schemas.microsoft.com/office/2006/metadata/properties/metaAttributes" ct:_="" ma:_="" ma:contentTypeName="Document" ma:contentTypeID="0x01010082594255C9F47049B367F00913BED969" ma:contentTypeVersion="8" ma:contentTypeDescription="Create a new document." ma:contentTypeScope="" ma:versionID="669976127e9d99054ee2095d187ec24b">
   <xsd:schema xmlns:xsd="http://www.w3.org/2001/XMLSchema" xmlns:xs="http://www.w3.org/2001/XMLSchema" xmlns:p="http://schemas.microsoft.com/office/2006/metadata/properties" xmlns:ns2="86177072-acf3-469b-be5f-1201de6410bb" xmlns:ns3="81b85e46-be1c-4d4d-af3f-3ff4749bae08" targetNamespace="http://schemas.microsoft.com/office/2006/metadata/properties" ma:root="true" ma:fieldsID="480bda1865dbc1f7ead824dac06b125f" ns2:_="" ns3:_="">
     <xsd:import namespace="86177072-acf3-469b-be5f-1201de6410bb"/>
@@ -4385,6 +4144,15 @@
 </ct:contentTypeSchema>
 </file>
 
+<file path=customXml/item3.xml><?xml version="1.0" encoding="utf-8"?>
+<?mso-contentType ?>
+<FormTemplates xmlns="http://schemas.microsoft.com/sharepoint/v3/contenttype/forms">
+  <Display>DocumentLibraryForm</Display>
+  <Edit>DocumentLibraryForm</Edit>
+  <New>DocumentLibraryForm</New>
+</FormTemplates>
+</file>
+
 <file path=customXml/itemProps1.xml><?xml version="1.0" encoding="utf-8"?>
 <ds:datastoreItem xmlns:ds="http://schemas.openxmlformats.org/officeDocument/2006/customXml" ds:itemID="{FA0A2C6C-ACEB-4D76-A29E-B1C9FEC52B8B}">
   <ds:schemaRefs>
@@ -4396,14 +4164,6 @@
 </file>
 
 <file path=customXml/itemProps2.xml><?xml version="1.0" encoding="utf-8"?>
-<ds:datastoreItem xmlns:ds="http://schemas.openxmlformats.org/officeDocument/2006/customXml" ds:itemID="{473D82A4-28C2-4B97-A470-A3247BBF4BEB}">
-  <ds:schemaRefs>
-    <ds:schemaRef ds:uri="http://schemas.microsoft.com/sharepoint/v3/contenttype/forms"/>
-  </ds:schemaRefs>
-</ds:datastoreItem>
-</file>
-
-<file path=customXml/itemProps3.xml><?xml version="1.0" encoding="utf-8"?>
 <ds:datastoreItem xmlns:ds="http://schemas.openxmlformats.org/officeDocument/2006/customXml" ds:itemID="{751A6194-F0BD-4282-83C9-95DFBAD1B667}">
   <ds:schemaRefs>
     <ds:schemaRef ds:uri="http://schemas.microsoft.com/office/2006/metadata/contentType"/>
@@ -4414,4 +4174,12 @@
     <ds:schemaRef ds:uri="81b85e46-be1c-4d4d-af3f-3ff4749bae08"/>
   </ds:schemaRefs>
 </ds:datastoreItem>
+</file>
+
+<file path=customXml/itemProps3.xml><?xml version="1.0" encoding="utf-8"?>
+<ds:datastoreItem xmlns:ds="http://schemas.openxmlformats.org/officeDocument/2006/customXml" ds:itemID="{473D82A4-28C2-4B97-A470-A3247BBF4BEB}">
+  <ds:schemaRefs>
+    <ds:schemaRef ds:uri="http://schemas.microsoft.com/sharepoint/v3/contenttype/forms"/>
+  </ds:schemaRefs>
+</ds:datastoreItem>
 </file>
</xml_diff>